<commit_message>
#2 ppt fixelve hogy reflektálja a valóságot
</commit_message>
<xml_diff>
--- a/Darts.pptx
+++ b/Darts.pptx
@@ -301,7 +301,7 @@
           <a:p>
             <a:fld id="{A852D9F6-D7CA-4FD8-9CD8-DF93E04C983C}" type="datetimeFigureOut">
               <a:rPr lang="hu-HU" smtClean="0"/>
-              <a:t>2025.01.22</a:t>
+              <a:t>2025.01.29</a:t>
             </a:fld>
             <a:endParaRPr lang="hu-HU"/>
           </a:p>
@@ -599,7 +599,7 @@
           <a:p>
             <a:fld id="{A852D9F6-D7CA-4FD8-9CD8-DF93E04C983C}" type="datetimeFigureOut">
               <a:rPr lang="hu-HU" smtClean="0"/>
-              <a:t>2025.01.22</a:t>
+              <a:t>2025.01.29</a:t>
             </a:fld>
             <a:endParaRPr lang="hu-HU"/>
           </a:p>
@@ -791,7 +791,7 @@
           <a:p>
             <a:fld id="{A852D9F6-D7CA-4FD8-9CD8-DF93E04C983C}" type="datetimeFigureOut">
               <a:rPr lang="hu-HU" smtClean="0"/>
-              <a:t>2025.01.22</a:t>
+              <a:t>2025.01.29</a:t>
             </a:fld>
             <a:endParaRPr lang="hu-HU"/>
           </a:p>
@@ -1052,7 +1052,7 @@
           <a:p>
             <a:fld id="{A852D9F6-D7CA-4FD8-9CD8-DF93E04C983C}" type="datetimeFigureOut">
               <a:rPr lang="hu-HU" smtClean="0"/>
-              <a:t>2025.01.22</a:t>
+              <a:t>2025.01.29</a:t>
             </a:fld>
             <a:endParaRPr lang="hu-HU"/>
           </a:p>
@@ -1476,7 +1476,7 @@
           <a:p>
             <a:fld id="{A852D9F6-D7CA-4FD8-9CD8-DF93E04C983C}" type="datetimeFigureOut">
               <a:rPr lang="hu-HU" smtClean="0"/>
-              <a:t>2025.01.22</a:t>
+              <a:t>2025.01.29</a:t>
             </a:fld>
             <a:endParaRPr lang="hu-HU"/>
           </a:p>
@@ -2013,7 +2013,7 @@
           <a:p>
             <a:fld id="{A852D9F6-D7CA-4FD8-9CD8-DF93E04C983C}" type="datetimeFigureOut">
               <a:rPr lang="hu-HU" smtClean="0"/>
-              <a:t>2025.01.22</a:t>
+              <a:t>2025.01.29</a:t>
             </a:fld>
             <a:endParaRPr lang="hu-HU"/>
           </a:p>
@@ -2877,7 +2877,7 @@
           <a:p>
             <a:fld id="{A852D9F6-D7CA-4FD8-9CD8-DF93E04C983C}" type="datetimeFigureOut">
               <a:rPr lang="hu-HU" smtClean="0"/>
-              <a:t>2025.01.22</a:t>
+              <a:t>2025.01.29</a:t>
             </a:fld>
             <a:endParaRPr lang="hu-HU"/>
           </a:p>
@@ -3047,7 +3047,7 @@
           <a:p>
             <a:fld id="{A852D9F6-D7CA-4FD8-9CD8-DF93E04C983C}" type="datetimeFigureOut">
               <a:rPr lang="hu-HU" smtClean="0"/>
-              <a:t>2025.01.22</a:t>
+              <a:t>2025.01.29</a:t>
             </a:fld>
             <a:endParaRPr lang="hu-HU"/>
           </a:p>
@@ -3231,7 +3231,7 @@
           <a:p>
             <a:fld id="{A852D9F6-D7CA-4FD8-9CD8-DF93E04C983C}" type="datetimeFigureOut">
               <a:rPr lang="hu-HU" smtClean="0"/>
-              <a:t>2025.01.22</a:t>
+              <a:t>2025.01.29</a:t>
             </a:fld>
             <a:endParaRPr lang="hu-HU"/>
           </a:p>
@@ -3401,7 +3401,7 @@
           <a:p>
             <a:fld id="{A852D9F6-D7CA-4FD8-9CD8-DF93E04C983C}" type="datetimeFigureOut">
               <a:rPr lang="hu-HU" smtClean="0"/>
-              <a:t>2025.01.22</a:t>
+              <a:t>2025.01.29</a:t>
             </a:fld>
             <a:endParaRPr lang="hu-HU"/>
           </a:p>
@@ -3645,7 +3645,7 @@
           <a:p>
             <a:fld id="{A852D9F6-D7CA-4FD8-9CD8-DF93E04C983C}" type="datetimeFigureOut">
               <a:rPr lang="hu-HU" smtClean="0"/>
-              <a:t>2025.01.22</a:t>
+              <a:t>2025.01.29</a:t>
             </a:fld>
             <a:endParaRPr lang="hu-HU"/>
           </a:p>
@@ -3881,7 +3881,7 @@
           <a:p>
             <a:fld id="{A852D9F6-D7CA-4FD8-9CD8-DF93E04C983C}" type="datetimeFigureOut">
               <a:rPr lang="hu-HU" smtClean="0"/>
-              <a:t>2025.01.22</a:t>
+              <a:t>2025.01.29</a:t>
             </a:fld>
             <a:endParaRPr lang="hu-HU"/>
           </a:p>
@@ -4347,7 +4347,7 @@
           <a:p>
             <a:fld id="{A852D9F6-D7CA-4FD8-9CD8-DF93E04C983C}" type="datetimeFigureOut">
               <a:rPr lang="hu-HU" smtClean="0"/>
-              <a:t>2025.01.22</a:t>
+              <a:t>2025.01.29</a:t>
             </a:fld>
             <a:endParaRPr lang="hu-HU"/>
           </a:p>
@@ -4465,7 +4465,7 @@
           <a:p>
             <a:fld id="{A852D9F6-D7CA-4FD8-9CD8-DF93E04C983C}" type="datetimeFigureOut">
               <a:rPr lang="hu-HU" smtClean="0"/>
-              <a:t>2025.01.22</a:t>
+              <a:t>2025.01.29</a:t>
             </a:fld>
             <a:endParaRPr lang="hu-HU"/>
           </a:p>
@@ -4560,7 +4560,7 @@
           <a:p>
             <a:fld id="{A852D9F6-D7CA-4FD8-9CD8-DF93E04C983C}" type="datetimeFigureOut">
               <a:rPr lang="hu-HU" smtClean="0"/>
-              <a:t>2025.01.22</a:t>
+              <a:t>2025.01.29</a:t>
             </a:fld>
             <a:endParaRPr lang="hu-HU"/>
           </a:p>
@@ -4815,7 +4815,7 @@
           <a:p>
             <a:fld id="{A852D9F6-D7CA-4FD8-9CD8-DF93E04C983C}" type="datetimeFigureOut">
               <a:rPr lang="hu-HU" smtClean="0"/>
-              <a:t>2025.01.22</a:t>
+              <a:t>2025.01.29</a:t>
             </a:fld>
             <a:endParaRPr lang="hu-HU"/>
           </a:p>
@@ -5115,7 +5115,7 @@
           <a:p>
             <a:fld id="{A852D9F6-D7CA-4FD8-9CD8-DF93E04C983C}" type="datetimeFigureOut">
               <a:rPr lang="hu-HU" smtClean="0"/>
-              <a:t>2025.01.22</a:t>
+              <a:t>2025.01.29</a:t>
             </a:fld>
             <a:endParaRPr lang="hu-HU"/>
           </a:p>
@@ -5349,7 +5349,7 @@
           <a:p>
             <a:fld id="{A852D9F6-D7CA-4FD8-9CD8-DF93E04C983C}" type="datetimeFigureOut">
               <a:rPr lang="hu-HU" smtClean="0"/>
-              <a:t>2025.01.22</a:t>
+              <a:t>2025.01.29</a:t>
             </a:fld>
             <a:endParaRPr lang="hu-HU"/>
           </a:p>
@@ -6176,10 +6176,10 @@
             </a:r>
           </a:p>
           <a:p>
-            <a:r>
-              <a:rPr lang="hu-HU" dirty="0"/>
-              <a:t>Verseny (több játékos)</a:t>
-            </a:r>
+            <a:pPr marL="36900" indent="0">
+              <a:buNone/>
+            </a:pPr>
+            <a:endParaRPr lang="hu-HU" dirty="0"/>
           </a:p>
         </p:txBody>
       </p:sp>
@@ -6524,8 +6524,8 @@
         </p:nvSpPr>
         <p:spPr>
           <a:xfrm>
-            <a:off x="1944498" y="2446818"/>
-            <a:ext cx="2239860" cy="646331"/>
+            <a:off x="2133775" y="2675979"/>
+            <a:ext cx="2239860" cy="369332"/>
           </a:xfrm>
           <a:prstGeom prst="rect">
             <a:avLst/>
@@ -6540,15 +6540,7 @@
           <a:p>
             <a:r>
               <a:rPr lang="hu-HU" dirty="0"/>
-              <a:t>Pontszektorok </a:t>
-            </a:r>
-            <a:r>
-              <a:rPr lang="hu-HU" dirty="0" err="1"/>
-              <a:t>canvas</a:t>
-            </a:r>
-            <a:r>
-              <a:rPr lang="hu-HU" dirty="0"/>
-              <a:t> segítségével</a:t>
+              <a:t>Pontszektorok</a:t>
             </a:r>
           </a:p>
         </p:txBody>
@@ -6754,7 +6746,83 @@
           <a:bodyPr/>
           <a:lstStyle/>
           <a:p>
-            <a:endParaRPr lang="hu-HU"/>
+            <a:pPr marL="36900" indent="0">
+              <a:buNone/>
+            </a:pPr>
+            <a:r>
+              <a:rPr lang="hu-HU" dirty="0"/>
+              <a:t>PowerPoint prezentáció: Pap László</a:t>
+            </a:r>
+            <a:br>
+              <a:rPr lang="hu-HU" dirty="0"/>
+            </a:br>
+            <a:r>
+              <a:rPr lang="hu-HU" dirty="0"/>
+              <a:t>Readme.md: Kapocsi Hunor</a:t>
+            </a:r>
+            <a:br>
+              <a:rPr lang="hu-HU" dirty="0"/>
+            </a:br>
+            <a:r>
+              <a:rPr lang="hu-HU" dirty="0"/>
+              <a:t>XAML: Pintér Bálint</a:t>
+            </a:r>
+            <a:br>
+              <a:rPr lang="hu-HU" dirty="0"/>
+            </a:br>
+            <a:r>
+              <a:rPr lang="hu-HU" dirty="0"/>
+              <a:t>501: Pap László</a:t>
+            </a:r>
+            <a:br>
+              <a:rPr lang="hu-HU" dirty="0"/>
+            </a:br>
+            <a:r>
+              <a:rPr lang="hu-HU" dirty="0" err="1"/>
+              <a:t>Shanghai</a:t>
+            </a:r>
+            <a:r>
+              <a:rPr lang="hu-HU" dirty="0"/>
+              <a:t>: Kapocsi Hunor</a:t>
+            </a:r>
+            <a:br>
+              <a:rPr lang="hu-HU" dirty="0"/>
+            </a:br>
+            <a:r>
+              <a:rPr lang="hu-HU" dirty="0" err="1"/>
+              <a:t>Around</a:t>
+            </a:r>
+            <a:r>
+              <a:rPr lang="hu-HU" dirty="0"/>
+              <a:t> </a:t>
+            </a:r>
+            <a:r>
+              <a:rPr lang="hu-HU" dirty="0" err="1"/>
+              <a:t>the</a:t>
+            </a:r>
+            <a:r>
+              <a:rPr lang="hu-HU" dirty="0"/>
+              <a:t> </a:t>
+            </a:r>
+            <a:r>
+              <a:rPr lang="hu-HU" dirty="0" err="1"/>
+              <a:t>Clock</a:t>
+            </a:r>
+            <a:r>
+              <a:rPr lang="hu-HU" dirty="0"/>
+              <a:t>: Pintér Bálint</a:t>
+            </a:r>
+            <a:br>
+              <a:rPr lang="hu-HU" dirty="0"/>
+            </a:br>
+            <a:r>
+              <a:rPr lang="hu-HU" dirty="0"/>
+              <a:t>Játék alapjai (működés, pontszámlálás stb.): Pap László, Kapocsi Hunor</a:t>
+            </a:r>
+            <a:br>
+              <a:rPr lang="hu-HU" dirty="0"/>
+            </a:br>
+            <a:endParaRPr lang="hu-HU" dirty="0"/>
           </a:p>
         </p:txBody>
       </p:sp>

</xml_diff>